<commit_message>
update UI portion of design.md
1. Make mentions to *Servlets other than ControllerServlet, *Results other than ShowPageResult.
2. Add explanations to automated requests (cron jobs, task queue workers).
3. Update the package diagram to reflect the current architecture and new colour scheme.
</commit_message>
<xml_diff>
--- a/docs/images/UiWorkflow.pptx
+++ b/docs/images/UiWorkflow.pptx
@@ -107,6 +107,22 @@
       </a:defRPr>
     </a:lvl9pPr>
   </p:defaultTextStyle>
+  <p:extLst>
+    <p:ext uri="{EFAFB233-063F-42B5-8137-9DF3F51BA10A}">
+      <p15:sldGuideLst xmlns:p15="http://schemas.microsoft.com/office/powerpoint/2012/main">
+        <p15:guide id="1" orient="horz" pos="2721">
+          <p15:clr>
+            <a:srgbClr val="A4A3A4"/>
+          </p15:clr>
+        </p15:guide>
+        <p15:guide id="2" pos="4084">
+          <p15:clr>
+            <a:srgbClr val="A4A3A4"/>
+          </p15:clr>
+        </p15:guide>
+      </p15:sldGuideLst>
+    </p:ext>
+  </p:extLst>
 </p:presentation>
 </file>
 
@@ -192,7 +208,7 @@
           <a:p>
             <a:fld id="{DC50A2AC-D691-437C-A69B-81ECFE08AD4B}" type="datetimeFigureOut">
               <a:rPr lang="en-SG" smtClean="0"/>
-              <a:t>5/7/2013</a:t>
+              <a:t>28/1/2017</a:t>
             </a:fld>
             <a:endParaRPr lang="en-SG"/>
           </a:p>
@@ -731,7 +747,7 @@
             <a:fld id="{1D8BD707-D9CF-40AE-B4C6-C98DA3205C09}" type="datetimeFigureOut">
               <a:rPr lang="en-US" smtClean="0"/>
               <a:pPr/>
-              <a:t>7/5/2013</a:t>
+              <a:t>1/28/2017</a:t>
             </a:fld>
             <a:endParaRPr lang="en-US"/>
           </a:p>
@@ -898,7 +914,7 @@
             <a:fld id="{1D8BD707-D9CF-40AE-B4C6-C98DA3205C09}" type="datetimeFigureOut">
               <a:rPr lang="en-US" smtClean="0"/>
               <a:pPr/>
-              <a:t>7/5/2013</a:t>
+              <a:t>1/28/2017</a:t>
             </a:fld>
             <a:endParaRPr lang="en-US"/>
           </a:p>
@@ -1075,7 +1091,7 @@
             <a:fld id="{1D8BD707-D9CF-40AE-B4C6-C98DA3205C09}" type="datetimeFigureOut">
               <a:rPr lang="en-US" smtClean="0"/>
               <a:pPr/>
-              <a:t>7/5/2013</a:t>
+              <a:t>1/28/2017</a:t>
             </a:fld>
             <a:endParaRPr lang="en-US"/>
           </a:p>
@@ -1242,7 +1258,7 @@
             <a:fld id="{1D8BD707-D9CF-40AE-B4C6-C98DA3205C09}" type="datetimeFigureOut">
               <a:rPr lang="en-US" smtClean="0"/>
               <a:pPr/>
-              <a:t>7/5/2013</a:t>
+              <a:t>1/28/2017</a:t>
             </a:fld>
             <a:endParaRPr lang="en-US"/>
           </a:p>
@@ -1485,7 +1501,7 @@
             <a:fld id="{1D8BD707-D9CF-40AE-B4C6-C98DA3205C09}" type="datetimeFigureOut">
               <a:rPr lang="en-US" smtClean="0"/>
               <a:pPr/>
-              <a:t>7/5/2013</a:t>
+              <a:t>1/28/2017</a:t>
             </a:fld>
             <a:endParaRPr lang="en-US"/>
           </a:p>
@@ -1770,7 +1786,7 @@
             <a:fld id="{1D8BD707-D9CF-40AE-B4C6-C98DA3205C09}" type="datetimeFigureOut">
               <a:rPr lang="en-US" smtClean="0"/>
               <a:pPr/>
-              <a:t>7/5/2013</a:t>
+              <a:t>1/28/2017</a:t>
             </a:fld>
             <a:endParaRPr lang="en-US"/>
           </a:p>
@@ -2189,7 +2205,7 @@
             <a:fld id="{1D8BD707-D9CF-40AE-B4C6-C98DA3205C09}" type="datetimeFigureOut">
               <a:rPr lang="en-US" smtClean="0"/>
               <a:pPr/>
-              <a:t>7/5/2013</a:t>
+              <a:t>1/28/2017</a:t>
             </a:fld>
             <a:endParaRPr lang="en-US"/>
           </a:p>
@@ -2304,7 +2320,7 @@
             <a:fld id="{1D8BD707-D9CF-40AE-B4C6-C98DA3205C09}" type="datetimeFigureOut">
               <a:rPr lang="en-US" smtClean="0"/>
               <a:pPr/>
-              <a:t>7/5/2013</a:t>
+              <a:t>1/28/2017</a:t>
             </a:fld>
             <a:endParaRPr lang="en-US"/>
           </a:p>
@@ -2396,7 +2412,7 @@
             <a:fld id="{1D8BD707-D9CF-40AE-B4C6-C98DA3205C09}" type="datetimeFigureOut">
               <a:rPr lang="en-US" smtClean="0"/>
               <a:pPr/>
-              <a:t>7/5/2013</a:t>
+              <a:t>1/28/2017</a:t>
             </a:fld>
             <a:endParaRPr lang="en-US"/>
           </a:p>
@@ -2670,7 +2686,7 @@
             <a:fld id="{1D8BD707-D9CF-40AE-B4C6-C98DA3205C09}" type="datetimeFigureOut">
               <a:rPr lang="en-US" smtClean="0"/>
               <a:pPr/>
-              <a:t>7/5/2013</a:t>
+              <a:t>1/28/2017</a:t>
             </a:fld>
             <a:endParaRPr lang="en-US"/>
           </a:p>
@@ -2920,7 +2936,7 @@
             <a:fld id="{1D8BD707-D9CF-40AE-B4C6-C98DA3205C09}" type="datetimeFigureOut">
               <a:rPr lang="en-US" smtClean="0"/>
               <a:pPr/>
-              <a:t>7/5/2013</a:t>
+              <a:t>1/28/2017</a:t>
             </a:fld>
             <a:endParaRPr lang="en-US"/>
           </a:p>
@@ -3130,7 +3146,7 @@
             <a:fld id="{1D8BD707-D9CF-40AE-B4C6-C98DA3205C09}" type="datetimeFigureOut">
               <a:rPr lang="en-US" smtClean="0"/>
               <a:pPr/>
-              <a:t>7/5/2013</a:t>
+              <a:t>1/28/2017</a:t>
             </a:fld>
             <a:endParaRPr lang="en-US"/>
           </a:p>
@@ -3517,7 +3533,7 @@
           </a:prstGeom>
           <a:ln w="28575">
             <a:solidFill>
-              <a:srgbClr val="00B050"/>
+              <a:srgbClr val="7030A0"/>
             </a:solidFill>
             <a:prstDash val="sysDash"/>
           </a:ln>
@@ -5515,7 +5531,7 @@
           </a:prstGeom>
           <a:ln w="38100">
             <a:solidFill>
-              <a:srgbClr val="00B050"/>
+              <a:srgbClr val="7030A0"/>
             </a:solidFill>
             <a:prstDash val="sysDot"/>
             <a:headEnd type="arrow" w="med" len="med"/>
@@ -5600,30 +5616,22 @@
           <a:prstGeom prst="rect">
             <a:avLst/>
           </a:prstGeom>
-          <a:solidFill>
-            <a:schemeClr val="accent3">
-              <a:lumMod val="40000"/>
-              <a:lumOff val="60000"/>
-            </a:schemeClr>
-          </a:solidFill>
-          <a:ln>
-            <a:solidFill>
-              <a:srgbClr val="00B050"/>
-            </a:solidFill>
-          </a:ln>
+          <a:ln/>
         </p:spPr>
         <p:style>
           <a:lnRef idx="2">
-            <a:schemeClr val="accent6"/>
+            <a:schemeClr val="accent4">
+              <a:shade val="50000"/>
+            </a:schemeClr>
           </a:lnRef>
           <a:fillRef idx="1">
-            <a:schemeClr val="lt1"/>
+            <a:schemeClr val="accent4"/>
           </a:fillRef>
           <a:effectRef idx="0">
-            <a:schemeClr val="accent6"/>
+            <a:schemeClr val="accent4"/>
           </a:effectRef>
           <a:fontRef idx="minor">
-            <a:schemeClr val="dk1"/>
+            <a:schemeClr val="lt1"/>
           </a:fontRef>
         </p:style>
         <p:txBody>
@@ -5688,7 +5696,7 @@
           </a:prstGeom>
           <a:ln w="38100">
             <a:solidFill>
-              <a:srgbClr val="00B050"/>
+              <a:srgbClr val="7030A0"/>
             </a:solidFill>
             <a:prstDash val="sysDot"/>
             <a:headEnd type="arrow" w="med" len="med"/>
@@ -5783,17 +5791,7 @@
                   </a:schemeClr>
                 </a:solidFill>
               </a:rPr>
-              <a:t>populate </a:t>
-            </a:r>
-            <a:r>
-              <a:rPr lang="en-US" sz="1600" b="1" dirty="0" smtClean="0">
-                <a:solidFill>
-                  <a:schemeClr val="accent2">
-                    <a:lumMod val="75000"/>
-                  </a:schemeClr>
-                </a:solidFill>
-              </a:rPr>
-              <a:t>with data</a:t>
+              <a:t>populate with data</a:t>
             </a:r>
             <a:endParaRPr lang="en-SG" sz="1600" b="1" dirty="0">
               <a:solidFill>
@@ -5946,26 +5944,19 @@
           <a:prstGeom prst="rect">
             <a:avLst/>
           </a:prstGeom>
-          <a:solidFill>
-            <a:srgbClr val="92D050"/>
-          </a:solidFill>
-          <a:ln>
-            <a:solidFill>
-              <a:srgbClr val="00B050"/>
-            </a:solidFill>
-          </a:ln>
+          <a:ln/>
         </p:spPr>
         <p:style>
           <a:lnRef idx="2">
-            <a:schemeClr val="accent5">
+            <a:schemeClr val="accent4">
               <a:shade val="50000"/>
             </a:schemeClr>
           </a:lnRef>
           <a:fillRef idx="1">
-            <a:schemeClr val="accent5"/>
+            <a:schemeClr val="accent4"/>
           </a:fillRef>
           <a:effectRef idx="0">
-            <a:schemeClr val="accent5"/>
+            <a:schemeClr val="accent4"/>
           </a:effectRef>
           <a:fontRef idx="minor">
             <a:schemeClr val="lt1"/>
@@ -6203,30 +6194,22 @@
           <a:prstGeom prst="rect">
             <a:avLst/>
           </a:prstGeom>
-          <a:solidFill>
-            <a:schemeClr val="accent3">
-              <a:lumMod val="40000"/>
-              <a:lumOff val="60000"/>
-            </a:schemeClr>
-          </a:solidFill>
-          <a:ln>
-            <a:solidFill>
-              <a:srgbClr val="00B050"/>
-            </a:solidFill>
-          </a:ln>
+          <a:ln/>
         </p:spPr>
         <p:style>
           <a:lnRef idx="2">
-            <a:schemeClr val="accent6"/>
+            <a:schemeClr val="accent4">
+              <a:shade val="50000"/>
+            </a:schemeClr>
           </a:lnRef>
           <a:fillRef idx="1">
-            <a:schemeClr val="lt1"/>
+            <a:schemeClr val="accent4"/>
           </a:fillRef>
           <a:effectRef idx="0">
-            <a:schemeClr val="accent6"/>
+            <a:schemeClr val="accent4"/>
           </a:effectRef>
           <a:fontRef idx="minor">
-            <a:schemeClr val="dk1"/>
+            <a:schemeClr val="lt1"/>
           </a:fontRef>
         </p:style>
         <p:txBody>
@@ -6662,30 +6645,22 @@
           <a:prstGeom prst="rect">
             <a:avLst/>
           </a:prstGeom>
-          <a:solidFill>
-            <a:schemeClr val="accent3">
-              <a:lumMod val="40000"/>
-              <a:lumOff val="60000"/>
-            </a:schemeClr>
-          </a:solidFill>
-          <a:ln>
-            <a:solidFill>
-              <a:srgbClr val="00B050"/>
-            </a:solidFill>
-          </a:ln>
+          <a:ln/>
         </p:spPr>
         <p:style>
           <a:lnRef idx="2">
-            <a:schemeClr val="accent6"/>
+            <a:schemeClr val="accent4">
+              <a:shade val="50000"/>
+            </a:schemeClr>
           </a:lnRef>
           <a:fillRef idx="1">
-            <a:schemeClr val="lt1"/>
+            <a:schemeClr val="accent4"/>
           </a:fillRef>
           <a:effectRef idx="0">
-            <a:schemeClr val="accent6"/>
+            <a:schemeClr val="accent4"/>
           </a:effectRef>
           <a:fontRef idx="minor">
-            <a:schemeClr val="dk1"/>
+            <a:schemeClr val="lt1"/>
           </a:fontRef>
         </p:style>
         <p:txBody>
@@ -6713,7 +6688,7 @@
           </a:prstGeom>
           <a:ln w="38100">
             <a:solidFill>
-              <a:srgbClr val="00B050"/>
+              <a:srgbClr val="7030A0"/>
             </a:solidFill>
             <a:prstDash val="sysDot"/>
             <a:headEnd type="arrow" w="med" len="med"/>

</xml_diff>